<commit_message>
Updated Documentation and website
</commit_message>
<xml_diff>
--- a/Documentation/UGRADSPoster.pptx
+++ b/Documentation/UGRADSPoster.pptx
@@ -2651,6 +2651,71 @@
       </p:grpSpPr>
       <p:sp>
         <p:nvSpPr>
+          <p:cNvPr id="73" name="Rectangle 72"/>
+          <p:cNvSpPr/>
+          <p:nvPr/>
+        </p:nvSpPr>
+        <p:spPr bwMode="auto">
+          <a:xfrm>
+            <a:off x="30861000" y="21183600"/>
+            <a:ext cx="13030200" cy="4114800"/>
+          </a:xfrm>
+          <a:prstGeom prst="rect">
+            <a:avLst/>
+          </a:prstGeom>
+          <a:solidFill>
+            <a:schemeClr val="bg1">
+              <a:lumMod val="95000"/>
+            </a:schemeClr>
+          </a:solidFill>
+          <a:ln w="12700" cap="flat" cmpd="sng" algn="ctr">
+            <a:noFill/>
+            <a:prstDash val="solid"/>
+            <a:round/>
+            <a:headEnd type="none" w="med" len="med"/>
+            <a:tailEnd type="none" w="med" len="med"/>
+          </a:ln>
+          <a:effectLst/>
+        </p:spPr>
+        <p:txBody>
+          <a:bodyPr vert="horz" wrap="square" lIns="91440" tIns="45720" rIns="91440" bIns="45720" numCol="1" rtlCol="0" anchor="t" anchorCtr="0" compatLnSpc="1">
+            <a:prstTxWarp prst="textNoShape">
+              <a:avLst/>
+            </a:prstTxWarp>
+          </a:bodyPr>
+          <a:lstStyle/>
+          <a:p>
+            <a:pPr marL="0" marR="0" indent="0" algn="just" defTabSz="914400" rtl="0" eaLnBrk="0" fontAlgn="base" latinLnBrk="0" hangingPunct="0">
+              <a:lnSpc>
+                <a:spcPct val="100000"/>
+              </a:lnSpc>
+              <a:spcBef>
+                <a:spcPct val="50000"/>
+              </a:spcBef>
+              <a:spcAft>
+                <a:spcPct val="0"/>
+              </a:spcAft>
+              <a:buClrTx/>
+              <a:buSzTx/>
+              <a:buFontTx/>
+              <a:buNone/>
+              <a:tabLst/>
+            </a:pPr>
+            <a:endParaRPr kumimoji="0" lang="en-US" sz="2800" b="0" i="0" u="none" strike="noStrike" cap="none" normalizeH="0" baseline="0" smtClean="0">
+              <a:ln>
+                <a:noFill/>
+              </a:ln>
+              <a:solidFill>
+                <a:schemeClr val="tx1"/>
+              </a:solidFill>
+              <a:effectLst/>
+              <a:latin typeface="Helvetica" charset="0"/>
+            </a:endParaRPr>
+          </a:p>
+        </p:txBody>
+      </p:sp>
+      <p:sp>
+        <p:nvSpPr>
           <p:cNvPr id="181" name="Rectangle 180"/>
           <p:cNvSpPr/>
           <p:nvPr/>
@@ -2981,7 +3046,7 @@
         <p:spPr bwMode="auto">
           <a:xfrm>
             <a:off x="30861000" y="7162800"/>
-            <a:ext cx="13030200" cy="18059400"/>
+            <a:ext cx="13030200" cy="12781002"/>
           </a:xfrm>
           <a:prstGeom prst="rect">
             <a:avLst/>
@@ -3216,16 +3281,7 @@
                 </a:solidFill>
                 <a:latin typeface="Century Gothic" pitchFamily="34" charset="0"/>
               </a:rPr>
-              <a:t>Computer Science, </a:t>
-            </a:r>
-            <a:r>
-              <a:rPr lang="en-US" sz="5400" dirty="0" smtClean="0">
-                <a:solidFill>
-                  <a:schemeClr val="bg2"/>
-                </a:solidFill>
-                <a:latin typeface="Century Gothic" pitchFamily="34" charset="0"/>
-              </a:rPr>
-              <a:t>Northern </a:t>
+              <a:t>Computer Science, Northern </a:t>
             </a:r>
             <a:r>
               <a:rPr lang="en-US" sz="5400" dirty="0">
@@ -3565,23 +3621,8 @@
                 </a:solidFill>
                 <a:latin typeface="Century Gothic" pitchFamily="34" charset="0"/>
               </a:rPr>
-              <a:t>Engineering </a:t>
-            </a:r>
-            <a:r>
-              <a:rPr lang="en-US" sz="3200" dirty="0" smtClean="0">
-                <a:solidFill>
-                  <a:schemeClr val="bg1"/>
-                </a:solidFill>
-                <a:latin typeface="Century Gothic" pitchFamily="34" charset="0"/>
-              </a:rPr>
-              <a:t>Design</a:t>
-            </a:r>
-            <a:endParaRPr lang="en-US" sz="3200" dirty="0" smtClean="0">
-              <a:solidFill>
-                <a:schemeClr val="bg1"/>
-              </a:solidFill>
-              <a:latin typeface="Century Gothic" pitchFamily="34" charset="0"/>
-            </a:endParaRPr>
+              <a:t>Engineering Design</a:t>
+            </a:r>
           </a:p>
         </p:txBody>
       </p:sp>
@@ -3625,16 +3666,7 @@
                 </a:solidFill>
                 <a:latin typeface="Century Gothic" pitchFamily="34" charset="0"/>
               </a:rPr>
-              <a:t>K</a:t>
-            </a:r>
-            <a:r>
-              <a:rPr lang="en-US" sz="5400" dirty="0" smtClean="0">
-                <a:solidFill>
-                  <a:schemeClr val="bg2"/>
-                </a:solidFill>
-                <a:latin typeface="Century Gothic" pitchFamily="34" charset="0"/>
-              </a:rPr>
-              <a:t>imberly Oyama, Blayne Kennedy, Daren Rodhouse, Chihiro Sasaki  </a:t>
+              <a:t>Kimberly Oyama, Blayne Kennedy, Daren Rodhouse, Chihiro Sasaki  </a:t>
             </a:r>
             <a:endParaRPr lang="en-US" sz="5400" baseline="28000" dirty="0">
               <a:solidFill>
@@ -3677,14 +3709,6 @@
               </a:rPr>
               <a:t>MoneyClip Mobile (MCM) is a web-based payments infrastructure providing fee-free transactions to customers and merchants through the use of mobile devices. Dr. Joshua Cross of Hermes Commerce, Inc. is planning to make this mobile payment system more robust by providing targeted advertisements, coupons, and management of customer’s loyalty programs. </a:t>
             </a:r>
-            <a:endParaRPr lang="en-US" sz="3000" dirty="0">
-              <a:solidFill>
-                <a:schemeClr val="bg2">
-                  <a:lumMod val="50000"/>
-                </a:schemeClr>
-              </a:solidFill>
-              <a:latin typeface="Century Gothic" pitchFamily="34" charset="0"/>
-            </a:endParaRPr>
           </a:p>
         </p:txBody>
       </p:sp>
@@ -4964,14 +4988,6 @@
               </a:rPr>
               <a:t>functionalities are implemented on the Android, iOS, and website platforms.</a:t>
             </a:r>
-            <a:endParaRPr lang="en-US" sz="3000" dirty="0">
-              <a:solidFill>
-                <a:schemeClr val="bg2">
-                  <a:lumMod val="50000"/>
-                </a:schemeClr>
-              </a:solidFill>
-              <a:latin typeface="Century Gothic" pitchFamily="34" charset="0"/>
-            </a:endParaRPr>
           </a:p>
         </p:txBody>
       </p:sp>
@@ -5821,14 +5837,6 @@
               </a:rPr>
               <a:t>User</a:t>
             </a:r>
-            <a:endParaRPr lang="en-US" sz="3000" dirty="0">
-              <a:solidFill>
-                <a:schemeClr val="bg2">
-                  <a:lumMod val="50000"/>
-                </a:schemeClr>
-              </a:solidFill>
-              <a:latin typeface="Century Gothic" pitchFamily="34" charset="0"/>
-            </a:endParaRPr>
           </a:p>
         </p:txBody>
       </p:sp>
@@ -6425,7 +6433,7 @@
                     <a:bodyPr/>
                     <a:lstStyle/>
                     <a:p>
-                      <a:endParaRPr lang="en-US"/>
+                      <a:endParaRPr lang="en-US" dirty="0"/>
                     </a:p>
                   </a:txBody>
                   <a:tcPr/>
@@ -6674,6 +6682,203 @@
           </a:extLst>
         </p:spPr>
       </p:pic>
+      <p:sp>
+        <p:nvSpPr>
+          <p:cNvPr id="71" name="Rectangle 48"/>
+          <p:cNvSpPr>
+            <a:spLocks noChangeArrowheads="1"/>
+          </p:cNvSpPr>
+          <p:nvPr/>
+        </p:nvSpPr>
+        <p:spPr bwMode="auto">
+          <a:xfrm>
+            <a:off x="31529865" y="20175538"/>
+            <a:ext cx="10113963" cy="779462"/>
+          </a:xfrm>
+          <a:prstGeom prst="rect">
+            <a:avLst/>
+          </a:prstGeom>
+          <a:noFill/>
+          <a:ln w="12700">
+            <a:noFill/>
+            <a:miter lim="800000"/>
+            <a:headEnd/>
+            <a:tailEnd/>
+          </a:ln>
+        </p:spPr>
+        <p:txBody>
+          <a:bodyPr wrap="none" lIns="90488" tIns="44450" rIns="90488" bIns="44450" anchor="ctr"/>
+          <a:lstStyle/>
+          <a:p>
+            <a:pPr algn="l">
+              <a:spcBef>
+                <a:spcPct val="0"/>
+              </a:spcBef>
+            </a:pPr>
+            <a:r>
+              <a:rPr lang="en-US" sz="5500" b="1" dirty="0" smtClean="0">
+                <a:latin typeface="Lucida Sans" pitchFamily="34" charset="0"/>
+                <a:cs typeface="Lucida Sans" pitchFamily="34" charset="0"/>
+              </a:rPr>
+              <a:t>Statistics</a:t>
+            </a:r>
+            <a:endParaRPr lang="en-US" sz="5500" b="1" dirty="0">
+              <a:latin typeface="Lucida Sans" pitchFamily="34" charset="0"/>
+              <a:cs typeface="Lucida Sans" pitchFamily="34" charset="0"/>
+            </a:endParaRPr>
+          </a:p>
+        </p:txBody>
+      </p:sp>
+      <p:sp>
+        <p:nvSpPr>
+          <p:cNvPr id="2" name="Rectangle 1"/>
+          <p:cNvSpPr/>
+          <p:nvPr/>
+        </p:nvSpPr>
+        <p:spPr>
+          <a:xfrm>
+            <a:off x="31112777" y="21183600"/>
+            <a:ext cx="5990743" cy="2862322"/>
+          </a:xfrm>
+          <a:prstGeom prst="rect">
+            <a:avLst/>
+          </a:prstGeom>
+        </p:spPr>
+        <p:txBody>
+          <a:bodyPr wrap="none">
+            <a:spAutoFit/>
+          </a:bodyPr>
+          <a:lstStyle/>
+          <a:p>
+            <a:pPr marL="914400" lvl="1" indent="-457200">
+              <a:spcBef>
+                <a:spcPts val="0"/>
+              </a:spcBef>
+              <a:buFont typeface="Arial" pitchFamily="34" charset="0"/>
+              <a:buChar char="•"/>
+            </a:pPr>
+            <a:r>
+              <a:rPr lang="en-US" sz="3000" dirty="0">
+                <a:solidFill>
+                  <a:schemeClr val="bg2">
+                    <a:lumMod val="50000"/>
+                  </a:schemeClr>
+                </a:solidFill>
+                <a:latin typeface="Century Gothic" pitchFamily="34" charset="0"/>
+              </a:rPr>
+              <a:t>Memory </a:t>
+            </a:r>
+            <a:r>
+              <a:rPr lang="en-US" sz="3000" dirty="0" smtClean="0">
+                <a:solidFill>
+                  <a:schemeClr val="bg2">
+                    <a:lumMod val="50000"/>
+                  </a:schemeClr>
+                </a:solidFill>
+                <a:latin typeface="Century Gothic" pitchFamily="34" charset="0"/>
+              </a:rPr>
+              <a:t>Usage</a:t>
+            </a:r>
+          </a:p>
+          <a:p>
+            <a:pPr marL="1371600" lvl="2" indent="-457200">
+              <a:spcBef>
+                <a:spcPts val="0"/>
+              </a:spcBef>
+              <a:buFont typeface="Arial" pitchFamily="34" charset="0"/>
+              <a:buChar char="•"/>
+            </a:pPr>
+            <a:r>
+              <a:rPr lang="en-US" sz="3000" dirty="0" smtClean="0">
+                <a:solidFill>
+                  <a:schemeClr val="bg2">
+                    <a:lumMod val="50000"/>
+                  </a:schemeClr>
+                </a:solidFill>
+                <a:latin typeface="Century Gothic" pitchFamily="34" charset="0"/>
+              </a:rPr>
+              <a:t>On phone</a:t>
+            </a:r>
+          </a:p>
+          <a:p>
+            <a:pPr marL="1371600" lvl="2" indent="-457200">
+              <a:spcBef>
+                <a:spcPts val="0"/>
+              </a:spcBef>
+              <a:buFont typeface="Arial" pitchFamily="34" charset="0"/>
+              <a:buChar char="•"/>
+            </a:pPr>
+            <a:r>
+              <a:rPr lang="en-US" sz="3000" dirty="0" smtClean="0">
+                <a:solidFill>
+                  <a:schemeClr val="bg2">
+                    <a:lumMod val="50000"/>
+                  </a:schemeClr>
+                </a:solidFill>
+                <a:latin typeface="Century Gothic" pitchFamily="34" charset="0"/>
+              </a:rPr>
+              <a:t>On server</a:t>
+            </a:r>
+          </a:p>
+          <a:p>
+            <a:pPr marL="914400" lvl="1" indent="-457200">
+              <a:spcBef>
+                <a:spcPts val="0"/>
+              </a:spcBef>
+              <a:buFont typeface="Arial" pitchFamily="34" charset="0"/>
+              <a:buChar char="•"/>
+            </a:pPr>
+            <a:r>
+              <a:rPr lang="en-US" sz="3000" dirty="0" smtClean="0">
+                <a:solidFill>
+                  <a:schemeClr val="bg2">
+                    <a:lumMod val="50000"/>
+                  </a:schemeClr>
+                </a:solidFill>
+                <a:latin typeface="Century Gothic" pitchFamily="34" charset="0"/>
+              </a:rPr>
+              <a:t>Data Usage (transfer sizes)</a:t>
+            </a:r>
+          </a:p>
+          <a:p>
+            <a:pPr marL="914400" lvl="1" indent="-457200">
+              <a:spcBef>
+                <a:spcPts val="0"/>
+              </a:spcBef>
+              <a:buFont typeface="Arial" pitchFamily="34" charset="0"/>
+              <a:buChar char="•"/>
+            </a:pPr>
+            <a:r>
+              <a:rPr lang="en-US" sz="3000" dirty="0" smtClean="0">
+                <a:solidFill>
+                  <a:schemeClr val="bg2">
+                    <a:lumMod val="50000"/>
+                  </a:schemeClr>
+                </a:solidFill>
+                <a:latin typeface="Century Gothic" pitchFamily="34" charset="0"/>
+              </a:rPr>
+              <a:t>Processor Usage?</a:t>
+            </a:r>
+          </a:p>
+          <a:p>
+            <a:pPr marL="914400" lvl="1" indent="-457200">
+              <a:spcBef>
+                <a:spcPts val="0"/>
+              </a:spcBef>
+              <a:buFont typeface="Arial" pitchFamily="34" charset="0"/>
+              <a:buChar char="•"/>
+            </a:pPr>
+            <a:endParaRPr lang="en-US" sz="3000" dirty="0">
+              <a:solidFill>
+                <a:schemeClr val="bg2">
+                  <a:lumMod val="50000"/>
+                </a:schemeClr>
+              </a:solidFill>
+              <a:latin typeface="Century Gothic" pitchFamily="34" charset="0"/>
+            </a:endParaRPr>
+          </a:p>
+        </p:txBody>
+      </p:sp>
     </p:spTree>
   </p:cSld>
   <p:clrMapOvr>

</xml_diff>

<commit_message>
Updated UGRADS poster and presentation
</commit_message>
<xml_diff>
--- a/Documentation/UGRADSPoster.pptx
+++ b/Documentation/UGRADSPoster.pptx
@@ -2657,8 +2657,8 @@
         </p:nvSpPr>
         <p:spPr bwMode="auto">
           <a:xfrm>
-            <a:off x="31089600" y="20116800"/>
-            <a:ext cx="12801600" cy="5486400"/>
+            <a:off x="31089600" y="19812000"/>
+            <a:ext cx="12801600" cy="5872734"/>
           </a:xfrm>
           <a:prstGeom prst="rect">
             <a:avLst/>
@@ -3045,8 +3045,8 @@
         </p:nvSpPr>
         <p:spPr bwMode="auto">
           <a:xfrm>
-            <a:off x="31089600" y="7315200"/>
-            <a:ext cx="12801600" cy="10972800"/>
+            <a:off x="31089600" y="7391400"/>
+            <a:ext cx="12801600" cy="10521950"/>
           </a:xfrm>
           <a:prstGeom prst="rect">
             <a:avLst/>
@@ -3955,8 +3955,15 @@
                 </a:solidFill>
                 <a:latin typeface="Century Gothic" pitchFamily="34" charset="0"/>
               </a:rPr>
-              <a:t> of Northern Arizona </a:t>
-            </a:r>
+              <a:t> of Northern Arizona University</a:t>
+            </a:r>
+          </a:p>
+          <a:p>
+            <a:pPr algn="l">
+              <a:spcBef>
+                <a:spcPts val="0"/>
+              </a:spcBef>
+            </a:pPr>
             <a:r>
               <a:rPr lang="en-US" sz="3500" dirty="0" smtClean="0">
                 <a:solidFill>
@@ -3966,25 +3973,7 @@
                 </a:solidFill>
                 <a:latin typeface="Century Gothic" pitchFamily="34" charset="0"/>
               </a:rPr>
-              <a:t>University</a:t>
-            </a:r>
-          </a:p>
-          <a:p>
-            <a:pPr algn="l">
-              <a:spcBef>
-                <a:spcPts val="0"/>
-              </a:spcBef>
-            </a:pPr>
-            <a:r>
-              <a:rPr lang="en-US" sz="3500" dirty="0" smtClean="0">
-                <a:solidFill>
-                  <a:schemeClr val="bg2">
-                    <a:lumMod val="75000"/>
-                  </a:schemeClr>
-                </a:solidFill>
-                <a:latin typeface="Century Gothic" pitchFamily="34" charset="0"/>
-              </a:rPr>
-              <a:t>Test users</a:t>
+              <a:t>User Testing Volunteers</a:t>
             </a:r>
             <a:endParaRPr lang="en-US" sz="3500" dirty="0" smtClean="0">
               <a:solidFill>
@@ -5070,7 +5059,29 @@
                 </a:solidFill>
                 <a:latin typeface="Century Gothic" pitchFamily="34" charset="0"/>
               </a:rPr>
-              <a:t>: Architecture for the second localization functionality of directed ads and coupons.</a:t>
+              <a:t>: Architecture for the </a:t>
+            </a:r>
+            <a:r>
+              <a:rPr lang="en-US" sz="2500" dirty="0" smtClean="0">
+                <a:solidFill>
+                  <a:schemeClr val="bg2">
+                    <a:lumMod val="50000"/>
+                  </a:schemeClr>
+                </a:solidFill>
+                <a:latin typeface="Century Gothic" pitchFamily="34" charset="0"/>
+              </a:rPr>
+              <a:t>localization </a:t>
+            </a:r>
+            <a:r>
+              <a:rPr lang="en-US" sz="2500" dirty="0" smtClean="0">
+                <a:solidFill>
+                  <a:schemeClr val="bg2">
+                    <a:lumMod val="50000"/>
+                  </a:schemeClr>
+                </a:solidFill>
+                <a:latin typeface="Century Gothic" pitchFamily="34" charset="0"/>
+              </a:rPr>
+              <a:t>functionality of directed ads and coupons.</a:t>
             </a:r>
             <a:endParaRPr lang="en-US" sz="2500" dirty="0">
               <a:solidFill>
@@ -5717,7 +5728,29 @@
                 </a:solidFill>
                 <a:latin typeface="Century Gothic" pitchFamily="34" charset="0"/>
               </a:rPr>
-              <a:t>: Architecture for the first localization functionality between customer and merchant.</a:t>
+              <a:t>: Architecture for the </a:t>
+            </a:r>
+            <a:r>
+              <a:rPr lang="en-US" sz="2500" dirty="0" smtClean="0">
+                <a:solidFill>
+                  <a:schemeClr val="bg2">
+                    <a:lumMod val="50000"/>
+                  </a:schemeClr>
+                </a:solidFill>
+                <a:latin typeface="Century Gothic" pitchFamily="34" charset="0"/>
+              </a:rPr>
+              <a:t>localization </a:t>
+            </a:r>
+            <a:r>
+              <a:rPr lang="en-US" sz="2500" dirty="0" smtClean="0">
+                <a:solidFill>
+                  <a:schemeClr val="bg2">
+                    <a:lumMod val="50000"/>
+                  </a:schemeClr>
+                </a:solidFill>
+                <a:latin typeface="Century Gothic" pitchFamily="34" charset="0"/>
+              </a:rPr>
+              <a:t>functionality between customer and merchant.</a:t>
             </a:r>
             <a:endParaRPr lang="en-US" sz="2500" dirty="0">
               <a:solidFill>
@@ -5779,116 +5812,6 @@
       </p:sp>
       <p:sp>
         <p:nvSpPr>
-          <p:cNvPr id="175" name="Rectangle 174"/>
-          <p:cNvSpPr/>
-          <p:nvPr/>
-        </p:nvSpPr>
-        <p:spPr>
-          <a:xfrm>
-            <a:off x="31546800" y="7505343"/>
-            <a:ext cx="11430000" cy="1477328"/>
-          </a:xfrm>
-          <a:prstGeom prst="rect">
-            <a:avLst/>
-          </a:prstGeom>
-        </p:spPr>
-        <p:txBody>
-          <a:bodyPr wrap="square">
-            <a:spAutoFit/>
-          </a:bodyPr>
-          <a:lstStyle/>
-          <a:p>
-            <a:pPr>
-              <a:spcBef>
-                <a:spcPts val="0"/>
-              </a:spcBef>
-            </a:pPr>
-            <a:r>
-              <a:rPr lang="en-US" sz="3000" dirty="0" smtClean="0">
-                <a:solidFill>
-                  <a:schemeClr val="bg2">
-                    <a:lumMod val="50000"/>
-                  </a:schemeClr>
-                </a:solidFill>
-                <a:latin typeface="Century Gothic" pitchFamily="34" charset="0"/>
-              </a:rPr>
-              <a:t>The following </a:t>
-            </a:r>
-            <a:r>
-              <a:rPr lang="en-US" sz="3000" dirty="0" smtClean="0">
-                <a:solidFill>
-                  <a:schemeClr val="bg2">
-                    <a:lumMod val="50000"/>
-                  </a:schemeClr>
-                </a:solidFill>
-                <a:latin typeface="Century Gothic" pitchFamily="34" charset="0"/>
-              </a:rPr>
-              <a:t>was </a:t>
-            </a:r>
-            <a:r>
-              <a:rPr lang="en-US" sz="3000" dirty="0" smtClean="0">
-                <a:solidFill>
-                  <a:schemeClr val="bg2">
-                    <a:lumMod val="50000"/>
-                  </a:schemeClr>
-                </a:solidFill>
-                <a:latin typeface="Century Gothic" pitchFamily="34" charset="0"/>
-              </a:rPr>
-              <a:t>performed for the localization functions:</a:t>
-            </a:r>
-          </a:p>
-          <a:p>
-            <a:pPr marL="914400" lvl="1" indent="-457200">
-              <a:spcBef>
-                <a:spcPts val="0"/>
-              </a:spcBef>
-              <a:buFont typeface="Arial" pitchFamily="34" charset="0"/>
-              <a:buChar char="•"/>
-            </a:pPr>
-            <a:r>
-              <a:rPr lang="en-US" sz="3000" dirty="0" smtClean="0">
-                <a:solidFill>
-                  <a:schemeClr val="bg2">
-                    <a:lumMod val="50000"/>
-                  </a:schemeClr>
-                </a:solidFill>
-                <a:latin typeface="Century Gothic" pitchFamily="34" charset="0"/>
-              </a:rPr>
-              <a:t>Unit Testing </a:t>
-            </a:r>
-            <a:endParaRPr lang="en-US" sz="3000" dirty="0" smtClean="0">
-              <a:solidFill>
-                <a:schemeClr val="bg2">
-                  <a:lumMod val="50000"/>
-                </a:schemeClr>
-              </a:solidFill>
-              <a:latin typeface="Century Gothic" pitchFamily="34" charset="0"/>
-            </a:endParaRPr>
-          </a:p>
-          <a:p>
-            <a:pPr marL="914400" lvl="1" indent="-457200">
-              <a:spcBef>
-                <a:spcPts val="0"/>
-              </a:spcBef>
-              <a:buFont typeface="Arial" pitchFamily="34" charset="0"/>
-              <a:buChar char="•"/>
-            </a:pPr>
-            <a:r>
-              <a:rPr lang="en-US" sz="3000" dirty="0" smtClean="0">
-                <a:solidFill>
-                  <a:schemeClr val="bg2">
-                    <a:lumMod val="50000"/>
-                  </a:schemeClr>
-                </a:solidFill>
-                <a:latin typeface="Century Gothic" pitchFamily="34" charset="0"/>
-              </a:rPr>
-              <a:t>User Testing</a:t>
-            </a:r>
-          </a:p>
-        </p:txBody>
-      </p:sp>
-      <p:sp>
-        <p:nvSpPr>
           <p:cNvPr id="12" name="Rectangle 11"/>
           <p:cNvSpPr/>
           <p:nvPr/>
@@ -5928,18 +5851,7 @@
                 </a:solidFill>
                 <a:latin typeface="Century Gothic" pitchFamily="34" charset="0"/>
               </a:rPr>
-              <a:t>: </a:t>
-            </a:r>
-            <a:r>
-              <a:rPr lang="en-US" dirty="0" smtClean="0">
-                <a:solidFill>
-                  <a:schemeClr val="bg2">
-                    <a:lumMod val="50000"/>
-                  </a:schemeClr>
-                </a:solidFill>
-                <a:latin typeface="Century Gothic" pitchFamily="34" charset="0"/>
-              </a:rPr>
-              <a:t>The left image shows an iPhone screenshot of the home page of the merchant app.  The right image shows an Android screenshot of the merchant map page of the customer app. </a:t>
+              <a:t>: The left image shows an iPhone screenshot of the home page of the merchant app.  The right image shows an Android screenshot of the merchant map page of the customer app. </a:t>
             </a:r>
             <a:endParaRPr lang="en-US" dirty="0">
               <a:solidFill>
@@ -5962,7 +5874,7 @@
         </p:nvSpPr>
         <p:spPr bwMode="auto">
           <a:xfrm>
-            <a:off x="30957837" y="19202400"/>
+            <a:off x="30957837" y="18821400"/>
             <a:ext cx="10113963" cy="779462"/>
           </a:xfrm>
           <a:prstGeom prst="rect">
@@ -6008,13 +5920,13 @@
           <p:nvPr>
             <p:extLst>
               <p:ext uri="{D42A27DB-BD31-4B8C-83A1-F6EECF244321}">
-                <p14:modId xmlns:p14="http://schemas.microsoft.com/office/powerpoint/2010/main" val="1107306011"/>
+                <p14:modId xmlns:p14="http://schemas.microsoft.com/office/powerpoint/2010/main" val="1200316887"/>
               </p:ext>
             </p:extLst>
           </p:nvPr>
         </p:nvGraphicFramePr>
         <p:xfrm>
-          <a:off x="31394400" y="21366480"/>
+          <a:off x="31428558" y="21432951"/>
           <a:ext cx="11430000" cy="3779520"/>
         </p:xfrm>
         <a:graphic>
@@ -8941,7 +8853,7 @@
         </p:nvSpPr>
         <p:spPr bwMode="auto">
           <a:xfrm>
-            <a:off x="31318200" y="9144000"/>
+            <a:off x="31318200" y="7848600"/>
             <a:ext cx="10113963" cy="779462"/>
           </a:xfrm>
           <a:prstGeom prst="rect">
@@ -8986,7 +8898,7 @@
         </p:nvSpPr>
         <p:spPr>
           <a:xfrm>
-            <a:off x="31546800" y="9906000"/>
+            <a:off x="31546800" y="8610600"/>
             <a:ext cx="11430000" cy="4708981"/>
           </a:xfrm>
           <a:prstGeom prst="rect">
@@ -9181,7 +9093,7 @@
         </p:nvSpPr>
         <p:spPr bwMode="auto">
           <a:xfrm>
-            <a:off x="31318200" y="15193010"/>
+            <a:off x="31318200" y="14325600"/>
             <a:ext cx="10113963" cy="779462"/>
           </a:xfrm>
           <a:prstGeom prst="rect">
@@ -9265,7 +9177,7 @@
         </p:nvSpPr>
         <p:spPr>
           <a:xfrm>
-            <a:off x="31546800" y="15972472"/>
+            <a:off x="31546800" y="15105062"/>
             <a:ext cx="11430000" cy="1477328"/>
           </a:xfrm>
           <a:prstGeom prst="rect">
@@ -9305,7 +9217,7 @@
         </p:nvSpPr>
         <p:spPr>
           <a:xfrm>
-            <a:off x="31318200" y="20305693"/>
+            <a:off x="31318200" y="20000893"/>
             <a:ext cx="11658600" cy="954107"/>
           </a:xfrm>
           <a:prstGeom prst="rect">
@@ -9343,7 +9255,29 @@
                 </a:solidFill>
                 <a:latin typeface="Century Gothic" pitchFamily="34" charset="0"/>
               </a:rPr>
-              <a:t>Data transfer information for Android and iPhone.  Data transferred depends on the length of the specific record.</a:t>
+              <a:t>Data </a:t>
+            </a:r>
+            <a:r>
+              <a:rPr lang="en-US" dirty="0" smtClean="0">
+                <a:solidFill>
+                  <a:schemeClr val="bg2">
+                    <a:lumMod val="50000"/>
+                  </a:schemeClr>
+                </a:solidFill>
+                <a:latin typeface="Century Gothic" pitchFamily="34" charset="0"/>
+              </a:rPr>
+              <a:t>transfer, in bytes, between the apps and the server. Data </a:t>
+            </a:r>
+            <a:r>
+              <a:rPr lang="en-US" dirty="0" smtClean="0">
+                <a:solidFill>
+                  <a:schemeClr val="bg2">
+                    <a:lumMod val="50000"/>
+                  </a:schemeClr>
+                </a:solidFill>
+                <a:latin typeface="Century Gothic" pitchFamily="34" charset="0"/>
+              </a:rPr>
+              <a:t>transferred depends on the length of the specific record.</a:t>
             </a:r>
             <a:endParaRPr lang="en-US" b="1" dirty="0" smtClean="0">
               <a:solidFill>

</xml_diff>